<commit_message>
cleaned  up presentation from DogFoodCon19
</commit_message>
<xml_diff>
--- a/GitMerge.pptx
+++ b/GitMerge.pptx
@@ -43,6 +43,7 @@
     <p:sldId id="288" r:id="rId40"/>
     <p:sldId id="289" r:id="rId41"/>
     <p:sldId id="290" r:id="rId42"/>
+    <p:sldId id="291" r:id="rId43"/>
   </p:sldIdLst>
   <p:sldSz cx="13004800" cy="9753600"/>
   <p:notesSz cx="6858000" cy="9144000"/>
@@ -4868,6 +4869,10 @@
           </p:nvPr>
         </p:nvSpPr>
         <p:spPr>
+          <a:xfrm>
+            <a:off x="1270000" y="215900"/>
+            <a:ext cx="10464800" cy="2540000"/>
+          </a:xfrm>
           <a:prstGeom prst="rect">
             <a:avLst/>
           </a:prstGeom>
@@ -5234,10 +5239,10 @@
       </p:grpSpPr>
       <p:sp>
         <p:nvSpPr>
-          <p:cNvPr id="198" name="Branches"/>
+          <p:cNvPr id="198" name="DEMO!!!"/>
           <p:cNvSpPr txBox="1"/>
           <p:nvPr>
-            <p:ph type="ctrTitle"/>
+            <p:ph type="title"/>
           </p:nvPr>
         </p:nvSpPr>
         <p:spPr>
@@ -5251,35 +5256,7 @@
           <a:p>
             <a:pPr/>
             <a:r>
-              <a:t>Branches</a:t>
-            </a:r>
-          </a:p>
-        </p:txBody>
-      </p:sp>
-      <p:sp>
-        <p:nvSpPr>
-          <p:cNvPr id="199" name="Ever see a tree with 1 and only 1 branch?"/>
-          <p:cNvSpPr txBox="1"/>
-          <p:nvPr>
-            <p:ph type="subTitle" sz="quarter" idx="1"/>
-          </p:nvPr>
-        </p:nvSpPr>
-        <p:spPr>
-          <a:prstGeom prst="rect">
-            <a:avLst/>
-          </a:prstGeom>
-        </p:spPr>
-        <p:txBody>
-          <a:bodyPr/>
-          <a:lstStyle>
-            <a:lvl1pPr defTabSz="531622">
-              <a:defRPr sz="3367"/>
-            </a:lvl1pPr>
-          </a:lstStyle>
-          <a:p>
-            <a:pPr/>
-            <a:r>
-              <a:t>Ever see a tree with 1 and only 1 branch? </a:t>
+              <a:t>DEMO!!!</a:t>
             </a:r>
           </a:p>
         </p:txBody>
@@ -5312,10 +5289,10 @@
       </p:grpSpPr>
       <p:sp>
         <p:nvSpPr>
-          <p:cNvPr id="201" name="GIT Branches"/>
+          <p:cNvPr id="200" name="Branches"/>
           <p:cNvSpPr txBox="1"/>
           <p:nvPr>
-            <p:ph type="title"/>
+            <p:ph type="ctrTitle"/>
           </p:nvPr>
         </p:nvSpPr>
         <p:spPr>
@@ -5329,17 +5306,17 @@
           <a:p>
             <a:pPr/>
             <a:r>
-              <a:t>GIT Branches</a:t>
-            </a:r>
-          </a:p>
-        </p:txBody>
-      </p:sp>
-      <p:sp>
-        <p:nvSpPr>
-          <p:cNvPr id="202" name="Isolating Development…"/>
+              <a:t>Branches</a:t>
+            </a:r>
+          </a:p>
+        </p:txBody>
+      </p:sp>
+      <p:sp>
+        <p:nvSpPr>
+          <p:cNvPr id="201" name="Ever see a tree with 1 and only 1 branch?"/>
           <p:cNvSpPr txBox="1"/>
           <p:nvPr>
-            <p:ph type="body" sz="half" idx="1"/>
+            <p:ph type="subTitle" sz="quarter" idx="1"/>
           </p:nvPr>
         </p:nvSpPr>
         <p:spPr>
@@ -5349,62 +5326,19 @@
         </p:spPr>
         <p:txBody>
           <a:bodyPr/>
-          <a:lstStyle/>
-          <a:p>
-            <a:pPr/>
-            <a:r>
-              <a:t>Isolating Development</a:t>
-            </a:r>
-          </a:p>
-          <a:p>
-            <a:pPr/>
-            <a:r>
-              <a:t>Separating Prod from Dev codebases</a:t>
-            </a:r>
-          </a:p>
-          <a:p>
-            <a:pPr/>
-            <a:r>
-              <a:t>Separating developers</a:t>
-            </a:r>
-          </a:p>
-          <a:p>
-            <a:pPr/>
-            <a:r>
-              <a:t>Key = separate</a:t>
-            </a:r>
-          </a:p>
-        </p:txBody>
-      </p:sp>
-      <p:pic>
-        <p:nvPicPr>
-          <p:cNvPr id="203" name="Image" descr="Image"/>
-          <p:cNvPicPr>
-            <a:picLocks noChangeAspect="1"/>
-          </p:cNvPicPr>
-          <p:nvPr/>
-        </p:nvPicPr>
-        <p:blipFill>
-          <a:blip r:embed="rId2">
-            <a:extLst/>
-          </a:blip>
-          <a:stretch>
-            <a:fillRect/>
-          </a:stretch>
-        </p:blipFill>
-        <p:spPr>
-          <a:xfrm rot="16200000">
-            <a:off x="5961500" y="3795239"/>
-            <a:ext cx="6847600" cy="3877622"/>
-          </a:xfrm>
-          <a:prstGeom prst="rect">
-            <a:avLst/>
-          </a:prstGeom>
-          <a:ln w="12700">
-            <a:miter lim="400000"/>
-          </a:ln>
-        </p:spPr>
-      </p:pic>
+          <a:lstStyle>
+            <a:lvl1pPr defTabSz="531622">
+              <a:defRPr sz="3367"/>
+            </a:lvl1pPr>
+          </a:lstStyle>
+          <a:p>
+            <a:pPr/>
+            <a:r>
+              <a:t>Ever see a tree with 1 and only 1 branch? </a:t>
+            </a:r>
+          </a:p>
+        </p:txBody>
+      </p:sp>
     </p:spTree>
   </p:cSld>
   <p:clrMapOvr>
@@ -5431,6 +5365,72 @@
           <a:chExt cx="0" cy="0"/>
         </a:xfrm>
       </p:grpSpPr>
+      <p:sp>
+        <p:nvSpPr>
+          <p:cNvPr id="203" name="GIT Branches"/>
+          <p:cNvSpPr txBox="1"/>
+          <p:nvPr>
+            <p:ph type="title"/>
+          </p:nvPr>
+        </p:nvSpPr>
+        <p:spPr>
+          <a:prstGeom prst="rect">
+            <a:avLst/>
+          </a:prstGeom>
+        </p:spPr>
+        <p:txBody>
+          <a:bodyPr/>
+          <a:lstStyle/>
+          <a:p>
+            <a:pPr/>
+            <a:r>
+              <a:t>GIT Branches</a:t>
+            </a:r>
+          </a:p>
+        </p:txBody>
+      </p:sp>
+      <p:sp>
+        <p:nvSpPr>
+          <p:cNvPr id="204" name="Isolating Development…"/>
+          <p:cNvSpPr txBox="1"/>
+          <p:nvPr>
+            <p:ph type="body" sz="half" idx="1"/>
+          </p:nvPr>
+        </p:nvSpPr>
+        <p:spPr>
+          <a:prstGeom prst="rect">
+            <a:avLst/>
+          </a:prstGeom>
+        </p:spPr>
+        <p:txBody>
+          <a:bodyPr/>
+          <a:lstStyle/>
+          <a:p>
+            <a:pPr/>
+            <a:r>
+              <a:t>Isolating Development</a:t>
+            </a:r>
+          </a:p>
+          <a:p>
+            <a:pPr/>
+            <a:r>
+              <a:t>Separating Prod from Dev codebases</a:t>
+            </a:r>
+          </a:p>
+          <a:p>
+            <a:pPr/>
+            <a:r>
+              <a:t>Separating developers</a:t>
+            </a:r>
+          </a:p>
+          <a:p>
+            <a:pPr/>
+            <a:r>
+              <a:t>Key = separate</a:t>
+            </a:r>
+          </a:p>
+        </p:txBody>
+      </p:sp>
       <p:pic>
         <p:nvPicPr>
           <p:cNvPr id="205" name="Image" descr="Image"/>
@@ -5448,9 +5448,9 @@
           </a:stretch>
         </p:blipFill>
         <p:spPr>
-          <a:xfrm>
-            <a:off x="239832" y="1478759"/>
-            <a:ext cx="12525136" cy="7092665"/>
+          <a:xfrm rot="16200000">
+            <a:off x="5961500" y="3795239"/>
+            <a:ext cx="6847600" cy="3877622"/>
           </a:xfrm>
           <a:prstGeom prst="rect">
             <a:avLst/>
@@ -5486,66 +5486,35 @@
           <a:chExt cx="0" cy="0"/>
         </a:xfrm>
       </p:grpSpPr>
-      <p:sp>
-        <p:nvSpPr>
-          <p:cNvPr id="207" name="Branches"/>
-          <p:cNvSpPr txBox="1"/>
-          <p:nvPr>
-            <p:ph type="title"/>
-          </p:nvPr>
-        </p:nvSpPr>
-        <p:spPr>
-          <a:prstGeom prst="rect">
-            <a:avLst/>
-          </a:prstGeom>
-        </p:spPr>
-        <p:txBody>
-          <a:bodyPr/>
-          <a:lstStyle/>
-          <a:p>
-            <a:pPr/>
-            <a:r>
-              <a:t>Branches</a:t>
-            </a:r>
-          </a:p>
-        </p:txBody>
-      </p:sp>
-      <p:sp>
-        <p:nvSpPr>
-          <p:cNvPr id="208" name="Isolate code!…"/>
-          <p:cNvSpPr txBox="1"/>
-          <p:nvPr>
-            <p:ph type="body" idx="1"/>
-          </p:nvPr>
-        </p:nvSpPr>
-        <p:spPr>
-          <a:prstGeom prst="rect">
-            <a:avLst/>
-          </a:prstGeom>
-        </p:spPr>
-        <p:txBody>
-          <a:bodyPr/>
-          <a:lstStyle/>
-          <a:p>
-            <a:pPr/>
-            <a:r>
-              <a:t>Isolate code!</a:t>
-            </a:r>
-          </a:p>
-          <a:p>
-            <a:pPr/>
-            <a:r>
-              <a:t>Keep Production codebase clean</a:t>
-            </a:r>
-          </a:p>
-          <a:p>
-            <a:pPr/>
-            <a:r>
-              <a:t>Allow experimentation without effecting production</a:t>
-            </a:r>
-          </a:p>
-        </p:txBody>
-      </p:sp>
+      <p:pic>
+        <p:nvPicPr>
+          <p:cNvPr id="207" name="Image" descr="Image"/>
+          <p:cNvPicPr>
+            <a:picLocks noChangeAspect="1"/>
+          </p:cNvPicPr>
+          <p:nvPr/>
+        </p:nvPicPr>
+        <p:blipFill>
+          <a:blip r:embed="rId2">
+            <a:extLst/>
+          </a:blip>
+          <a:stretch>
+            <a:fillRect/>
+          </a:stretch>
+        </p:blipFill>
+        <p:spPr>
+          <a:xfrm>
+            <a:off x="239832" y="1478759"/>
+            <a:ext cx="12525136" cy="7092665"/>
+          </a:xfrm>
+          <a:prstGeom prst="rect">
+            <a:avLst/>
+          </a:prstGeom>
+          <a:ln w="12700">
+            <a:miter lim="400000"/>
+          </a:ln>
+        </p:spPr>
+      </p:pic>
     </p:spTree>
   </p:cSld>
   <p:clrMapOvr>
@@ -5574,10 +5543,10 @@
       </p:grpSpPr>
       <p:sp>
         <p:nvSpPr>
-          <p:cNvPr id="210" name="git checkout -b &lt;&lt;branch&gt;&gt; create a new branch…"/>
+          <p:cNvPr id="209" name="Branches"/>
           <p:cNvSpPr txBox="1"/>
           <p:nvPr>
-            <p:ph type="body" idx="1"/>
+            <p:ph type="title"/>
           </p:nvPr>
         </p:nvSpPr>
         <p:spPr>
@@ -5591,45 +5560,43 @@
           <a:p>
             <a:pPr/>
             <a:r>
-              <a:t>git checkout -b &lt;&lt;branch&gt;&gt;</a:t>
-            </a:r>
-            <a:br/>
-            <a:r>
-              <a:t>create a new branch</a:t>
-            </a:r>
-          </a:p>
-          <a:p>
-            <a:pPr/>
-            <a:r>
-              <a:t>git branch</a:t>
-            </a:r>
-            <a:br/>
-            <a:r>
-              <a:t>see branches</a:t>
-            </a:r>
-          </a:p>
-          <a:p>
-            <a:pPr/>
-            <a:r>
-              <a:t>git merge &lt;&lt;branch&gt;&gt; </a:t>
-            </a:r>
-            <a:br/>
-            <a:r>
-              <a:t>merge changes to branch you are on</a:t>
-            </a:r>
-          </a:p>
-          <a:p>
-            <a:pPr/>
-            <a:r>
-              <a:t>git branch -d &lt;&lt;branch&gt;&gt;</a:t>
-            </a:r>
-            <a:br/>
-            <a:r>
-              <a:t>git push origin --delete &lt;&lt;branch&gt;&gt;</a:t>
-            </a:r>
-            <a:br/>
-            <a:r>
-              <a:t>delete branch (local/remote)</a:t>
+              <a:t>Branches</a:t>
+            </a:r>
+          </a:p>
+        </p:txBody>
+      </p:sp>
+      <p:sp>
+        <p:nvSpPr>
+          <p:cNvPr id="210" name="Isolate code!…"/>
+          <p:cNvSpPr txBox="1"/>
+          <p:nvPr>
+            <p:ph type="body" idx="1"/>
+          </p:nvPr>
+        </p:nvSpPr>
+        <p:spPr>
+          <a:prstGeom prst="rect">
+            <a:avLst/>
+          </a:prstGeom>
+        </p:spPr>
+        <p:txBody>
+          <a:bodyPr/>
+          <a:lstStyle/>
+          <a:p>
+            <a:pPr/>
+            <a:r>
+              <a:t>Isolate code!</a:t>
+            </a:r>
+          </a:p>
+          <a:p>
+            <a:pPr/>
+            <a:r>
+              <a:t>Keep Production codebase clean</a:t>
+            </a:r>
+          </a:p>
+          <a:p>
+            <a:pPr/>
+            <a:r>
+              <a:t>Allow experimentation without effecting production</a:t>
             </a:r>
           </a:p>
         </p:txBody>
@@ -5662,10 +5629,10 @@
       </p:grpSpPr>
       <p:sp>
         <p:nvSpPr>
-          <p:cNvPr id="212" name="DEMO!!!"/>
+          <p:cNvPr id="212" name="git checkout -b &lt;&lt;branch&gt;&gt; create a new branch…"/>
           <p:cNvSpPr txBox="1"/>
           <p:nvPr>
-            <p:ph type="title"/>
+            <p:ph type="body" idx="1"/>
           </p:nvPr>
         </p:nvSpPr>
         <p:spPr>
@@ -5679,7 +5646,45 @@
           <a:p>
             <a:pPr/>
             <a:r>
-              <a:t>DEMO!!!</a:t>
+              <a:t>git checkout -b &lt;&lt;branch&gt;&gt;</a:t>
+            </a:r>
+            <a:br/>
+            <a:r>
+              <a:t>create a new branch</a:t>
+            </a:r>
+          </a:p>
+          <a:p>
+            <a:pPr/>
+            <a:r>
+              <a:t>git branch</a:t>
+            </a:r>
+            <a:br/>
+            <a:r>
+              <a:t>see branches</a:t>
+            </a:r>
+          </a:p>
+          <a:p>
+            <a:pPr/>
+            <a:r>
+              <a:t>git merge &lt;&lt;branch&gt;&gt; </a:t>
+            </a:r>
+            <a:br/>
+            <a:r>
+              <a:t>merge changes to branch you are on</a:t>
+            </a:r>
+          </a:p>
+          <a:p>
+            <a:pPr/>
+            <a:r>
+              <a:t>git branch -d &lt;&lt;branch&gt;&gt;</a:t>
+            </a:r>
+            <a:br/>
+            <a:r>
+              <a:t>git push origin --delete &lt;&lt;branch&gt;&gt;</a:t>
+            </a:r>
+            <a:br/>
+            <a:r>
+              <a:t>delete branch (local/remote)</a:t>
             </a:r>
           </a:p>
         </p:txBody>
@@ -5712,38 +5717,10 @@
       </p:grpSpPr>
       <p:sp>
         <p:nvSpPr>
-          <p:cNvPr id="214" name="GIT Merge &amp; Branches"/>
+          <p:cNvPr id="214" name="DEMO!!!"/>
           <p:cNvSpPr txBox="1"/>
           <p:nvPr>
             <p:ph type="title"/>
-          </p:nvPr>
-        </p:nvSpPr>
-        <p:spPr>
-          <a:prstGeom prst="rect">
-            <a:avLst/>
-          </a:prstGeom>
-        </p:spPr>
-        <p:txBody>
-          <a:bodyPr/>
-          <a:lstStyle>
-            <a:lvl1pPr defTabSz="479044">
-              <a:defRPr sz="6560"/>
-            </a:lvl1pPr>
-          </a:lstStyle>
-          <a:p>
-            <a:pPr/>
-            <a:r>
-              <a:t>GIT Merge &amp; Branches</a:t>
-            </a:r>
-          </a:p>
-        </p:txBody>
-      </p:sp>
-      <p:sp>
-        <p:nvSpPr>
-          <p:cNvPr id="215" name="You need to be on the destination branch…"/>
-          <p:cNvSpPr txBox="1"/>
-          <p:nvPr>
-            <p:ph type="body" idx="1"/>
           </p:nvPr>
         </p:nvSpPr>
         <p:spPr>
@@ -5757,23 +5734,7 @@
           <a:p>
             <a:pPr/>
             <a:r>
-              <a:t>You need to be on the destination branch</a:t>
-            </a:r>
-          </a:p>
-          <a:p>
-            <a:pPr/>
-            <a:r>
-              <a:t>You merge into a branch</a:t>
-            </a:r>
-            <a:br/>
-            <a:r>
-              <a:t>git merge &lt;&lt;branch&gt;&gt;</a:t>
-            </a:r>
-          </a:p>
-          <a:p>
-            <a:pPr/>
-            <a:r>
-              <a:t>Sometimes you will not have conflict and it will just work and That’s All Folks!</a:t>
+              <a:t>DEMO!!!</a:t>
             </a:r>
           </a:p>
         </p:txBody>
@@ -5806,10 +5767,38 @@
       </p:grpSpPr>
       <p:sp>
         <p:nvSpPr>
-          <p:cNvPr id="217" name="Recap"/>
+          <p:cNvPr id="216" name="GIT Merge &amp; Branches"/>
           <p:cNvSpPr txBox="1"/>
           <p:nvPr>
             <p:ph type="title"/>
+          </p:nvPr>
+        </p:nvSpPr>
+        <p:spPr>
+          <a:prstGeom prst="rect">
+            <a:avLst/>
+          </a:prstGeom>
+        </p:spPr>
+        <p:txBody>
+          <a:bodyPr/>
+          <a:lstStyle>
+            <a:lvl1pPr defTabSz="479044">
+              <a:defRPr sz="6560"/>
+            </a:lvl1pPr>
+          </a:lstStyle>
+          <a:p>
+            <a:pPr/>
+            <a:r>
+              <a:t>GIT Merge &amp; Branches</a:t>
+            </a:r>
+          </a:p>
+        </p:txBody>
+      </p:sp>
+      <p:sp>
+        <p:nvSpPr>
+          <p:cNvPr id="217" name="You need to be on the destination branch…"/>
+          <p:cNvSpPr txBox="1"/>
+          <p:nvPr>
+            <p:ph type="body" idx="1"/>
           </p:nvPr>
         </p:nvSpPr>
         <p:spPr>
@@ -5823,43 +5812,23 @@
           <a:p>
             <a:pPr/>
             <a:r>
-              <a:t>Recap</a:t>
-            </a:r>
-          </a:p>
-        </p:txBody>
-      </p:sp>
-      <p:sp>
-        <p:nvSpPr>
-          <p:cNvPr id="218" name="Git Merge is not that scary at all…"/>
-          <p:cNvSpPr txBox="1"/>
-          <p:nvPr>
-            <p:ph type="body" idx="1"/>
-          </p:nvPr>
-        </p:nvSpPr>
-        <p:spPr>
-          <a:prstGeom prst="rect">
-            <a:avLst/>
-          </a:prstGeom>
-        </p:spPr>
-        <p:txBody>
-          <a:bodyPr/>
-          <a:lstStyle/>
-          <a:p>
-            <a:pPr/>
-            <a:r>
-              <a:t>Git Merge is not that scary at all</a:t>
-            </a:r>
-          </a:p>
-          <a:p>
-            <a:pPr/>
-            <a:r>
-              <a:t>If we mess up, we have options</a:t>
-            </a:r>
-          </a:p>
-          <a:p>
-            <a:pPr/>
-            <a:r>
-              <a:t>Can always save our work to separate branches</a:t>
+              <a:t>You need to be on the destination branch</a:t>
+            </a:r>
+          </a:p>
+          <a:p>
+            <a:pPr/>
+            <a:r>
+              <a:t>You merge into a branch</a:t>
+            </a:r>
+            <a:br/>
+            <a:r>
+              <a:t>git merge &lt;&lt;branch&gt;&gt;</a:t>
+            </a:r>
+          </a:p>
+          <a:p>
+            <a:pPr/>
+            <a:r>
+              <a:t>Sometimes you will not have conflict and it will just work and That’s All Folks!</a:t>
             </a:r>
           </a:p>
         </p:txBody>
@@ -5963,6 +5932,92 @@
 <file path=ppt/slides/slide30.xml><?xml version="1.0" encoding="utf-8"?>
 <p:sld xmlns:a="http://schemas.openxmlformats.org/drawingml/2006/main" xmlns:r="http://schemas.openxmlformats.org/officeDocument/2006/relationships" xmlns:p="http://schemas.openxmlformats.org/presentationml/2006/main" xmlns:m="http://schemas.openxmlformats.org/officeDocument/2006/math" xmlns:a14="http://schemas.microsoft.com/office/drawing/2010/main" showMasterSp="1" showMasterPhAnim="1">
   <p:cSld>
+    <p:spTree>
+      <p:nvGrpSpPr>
+        <p:cNvPr id="1" name=""/>
+        <p:cNvGrpSpPr/>
+        <p:nvPr/>
+      </p:nvGrpSpPr>
+      <p:grpSpPr>
+        <a:xfrm>
+          <a:off x="0" y="0"/>
+          <a:ext cx="0" cy="0"/>
+          <a:chOff x="0" y="0"/>
+          <a:chExt cx="0" cy="0"/>
+        </a:xfrm>
+      </p:grpSpPr>
+      <p:sp>
+        <p:nvSpPr>
+          <p:cNvPr id="219" name="Recap"/>
+          <p:cNvSpPr txBox="1"/>
+          <p:nvPr>
+            <p:ph type="title"/>
+          </p:nvPr>
+        </p:nvSpPr>
+        <p:spPr>
+          <a:prstGeom prst="rect">
+            <a:avLst/>
+          </a:prstGeom>
+        </p:spPr>
+        <p:txBody>
+          <a:bodyPr/>
+          <a:lstStyle/>
+          <a:p>
+            <a:pPr/>
+            <a:r>
+              <a:t>Recap</a:t>
+            </a:r>
+          </a:p>
+        </p:txBody>
+      </p:sp>
+      <p:sp>
+        <p:nvSpPr>
+          <p:cNvPr id="220" name="Git Merge is not that scary at all…"/>
+          <p:cNvSpPr txBox="1"/>
+          <p:nvPr>
+            <p:ph type="body" idx="1"/>
+          </p:nvPr>
+        </p:nvSpPr>
+        <p:spPr>
+          <a:prstGeom prst="rect">
+            <a:avLst/>
+          </a:prstGeom>
+        </p:spPr>
+        <p:txBody>
+          <a:bodyPr/>
+          <a:lstStyle/>
+          <a:p>
+            <a:pPr/>
+            <a:r>
+              <a:t>Git Merge is not that scary at all</a:t>
+            </a:r>
+          </a:p>
+          <a:p>
+            <a:pPr/>
+            <a:r>
+              <a:t>If we mess up, we have options</a:t>
+            </a:r>
+          </a:p>
+          <a:p>
+            <a:pPr/>
+            <a:r>
+              <a:t>Can always save our work to separate branches</a:t>
+            </a:r>
+          </a:p>
+        </p:txBody>
+      </p:sp>
+    </p:spTree>
+  </p:cSld>
+  <p:clrMapOvr>
+    <a:masterClrMapping/>
+  </p:clrMapOvr>
+  <p:transition xmlns:p14="http://schemas.microsoft.com/office/powerpoint/2010/main" spd="med" advClick="1"/>
+</p:sld>
+</file>
+
+<file path=ppt/slides/slide31.xml><?xml version="1.0" encoding="utf-8"?>
+<p:sld xmlns:a="http://schemas.openxmlformats.org/drawingml/2006/main" xmlns:r="http://schemas.openxmlformats.org/officeDocument/2006/relationships" xmlns:p="http://schemas.openxmlformats.org/presentationml/2006/main" xmlns:m="http://schemas.openxmlformats.org/officeDocument/2006/math" xmlns:a14="http://schemas.microsoft.com/office/drawing/2010/main" showMasterSp="1" showMasterPhAnim="1">
+  <p:cSld>
     <p:bg>
       <p:bgPr>
         <a:solidFill>
@@ -5986,7 +6041,7 @@
       </p:grpSpPr>
       <p:sp>
         <p:nvSpPr>
-          <p:cNvPr id="220" name="Victor J. Pudelski…"/>
+          <p:cNvPr id="222" name="Victor J. Pudelski…"/>
           <p:cNvSpPr txBox="1"/>
           <p:nvPr>
             <p:ph type="body" idx="13"/>
@@ -6028,7 +6083,7 @@
               <a:rPr u="sng">
                 <a:hlinkClick r:id="rId2" invalidUrl="" action="" tgtFrame="" tooltip="" history="1" highlightClick="0" endSnd="0"/>
               </a:rPr>
-              <a:t>vpudelski@nextlinksoftware.com</a:t>
+              <a:t>vjpudelski@gmail.com</a:t>
             </a:r>
           </a:p>
           <a:p>
@@ -6062,7 +6117,7 @@
       </p:sp>
       <p:sp>
         <p:nvSpPr>
-          <p:cNvPr id="221" name="THANK YOU!…"/>
+          <p:cNvPr id="223" name="THANK YOU!…"/>
           <p:cNvSpPr txBox="1"/>
           <p:nvPr>
             <p:ph type="body" idx="14"/>
@@ -6102,85 +6157,6 @@
             </a:pPr>
             <a:r>
               <a:t>QUESTIONS?</a:t>
-            </a:r>
-          </a:p>
-        </p:txBody>
-      </p:sp>
-    </p:spTree>
-  </p:cSld>
-  <p:clrMapOvr>
-    <a:masterClrMapping/>
-  </p:clrMapOvr>
-  <p:transition xmlns:p14="http://schemas.microsoft.com/office/powerpoint/2010/main" spd="med" advClick="1"/>
-</p:sld>
-</file>
-
-<file path=ppt/slides/slide31.xml><?xml version="1.0" encoding="utf-8"?>
-<p:sld xmlns:a="http://schemas.openxmlformats.org/drawingml/2006/main" xmlns:r="http://schemas.openxmlformats.org/officeDocument/2006/relationships" xmlns:p="http://schemas.openxmlformats.org/presentationml/2006/main" xmlns:m="http://schemas.openxmlformats.org/officeDocument/2006/math" xmlns:a14="http://schemas.microsoft.com/office/drawing/2010/main" showMasterSp="1" showMasterPhAnim="1">
-  <p:cSld>
-    <p:spTree>
-      <p:nvGrpSpPr>
-        <p:cNvPr id="1" name=""/>
-        <p:cNvGrpSpPr/>
-        <p:nvPr/>
-      </p:nvGrpSpPr>
-      <p:grpSpPr>
-        <a:xfrm>
-          <a:off x="0" y="0"/>
-          <a:ext cx="0" cy="0"/>
-          <a:chOff x="0" y="0"/>
-          <a:chExt cx="0" cy="0"/>
-        </a:xfrm>
-      </p:grpSpPr>
-      <p:sp>
-        <p:nvSpPr>
-          <p:cNvPr id="223" name="Bonus #1: git log"/>
-          <p:cNvSpPr txBox="1"/>
-          <p:nvPr>
-            <p:ph type="title"/>
-          </p:nvPr>
-        </p:nvSpPr>
-        <p:spPr>
-          <a:prstGeom prst="rect">
-            <a:avLst/>
-          </a:prstGeom>
-        </p:spPr>
-        <p:txBody>
-          <a:bodyPr/>
-          <a:lstStyle/>
-          <a:p>
-            <a:pPr/>
-            <a:r>
-              <a:t>Bonus #1: git log</a:t>
-            </a:r>
-          </a:p>
-        </p:txBody>
-      </p:sp>
-      <p:sp>
-        <p:nvSpPr>
-          <p:cNvPr id="224" name="git log --graph --pretty=format:'commit: %C(bold red)%h%Creset %C(red)&lt;%H&gt;%Creset %C(bold magenta)%d %Creset%ndate: %C(bold yellow)%cd %Creset%C(yellow)%cr%Creset%nauthor: %C(bold blue)%an%Creset %C(blue)&lt;%ae&gt;%Creset%n%C(cyan)%s%n%Creset'"/>
-          <p:cNvSpPr txBox="1"/>
-          <p:nvPr>
-            <p:ph type="body" idx="1"/>
-          </p:nvPr>
-        </p:nvSpPr>
-        <p:spPr>
-          <a:prstGeom prst="rect">
-            <a:avLst/>
-          </a:prstGeom>
-        </p:spPr>
-        <p:txBody>
-          <a:bodyPr/>
-          <a:lstStyle>
-            <a:lvl1pPr marL="0" indent="0">
-              <a:buSzTx/>
-              <a:buNone/>
-            </a:lvl1pPr>
-          </a:lstStyle>
-          <a:p>
-            <a:pPr/>
-            <a:r>
-              <a:t>git log --graph --pretty=format:'commit: %C(bold red)%h%Creset %C(red)&lt;%H&gt;%Creset %C(bold magenta)%d %Creset%ndate: %C(bold yellow)%cd %Creset%C(yellow)%cr%Creset%nauthor: %C(bold blue)%an%Creset %C(blue)&lt;%ae&gt;%Creset%n%C(cyan)%s%n%Creset'</a:t>
             </a:r>
           </a:p>
         </p:txBody>
@@ -6213,7 +6189,7 @@
       </p:grpSpPr>
       <p:sp>
         <p:nvSpPr>
-          <p:cNvPr id="226" name="--pretty=format"/>
+          <p:cNvPr id="225" name="Bonus #1: git log"/>
           <p:cNvSpPr txBox="1"/>
           <p:nvPr>
             <p:ph type="title"/>
@@ -6230,14 +6206,14 @@
           <a:p>
             <a:pPr/>
             <a:r>
-              <a:t>--pretty=format</a:t>
-            </a:r>
-          </a:p>
-        </p:txBody>
-      </p:sp>
-      <p:sp>
-        <p:nvSpPr>
-          <p:cNvPr id="227" name="commit: abbr commit hash &lt;commit hash&gt; (ref names)…"/>
+              <a:t>Bonus #1: git log</a:t>
+            </a:r>
+          </a:p>
+        </p:txBody>
+      </p:sp>
+      <p:sp>
+        <p:nvSpPr>
+          <p:cNvPr id="226" name="git log --graph --pretty=format:'commit: %C(bold red)%h%Creset %C(red)&lt;%H&gt;%Creset %C(bold magenta)%d %Creset%ndate: %C(bold yellow)%cd %Creset%C(yellow)%cr%Creset%nauthor: %C(bold blue)%an%Creset %C(blue)&lt;%ae&gt;%Creset%n%C(cyan)%s%n%Creset'"/>
           <p:cNvSpPr txBox="1"/>
           <p:nvPr>
             <p:ph type="body" idx="1"/>
@@ -6250,151 +6226,16 @@
         </p:spPr>
         <p:txBody>
           <a:bodyPr/>
-          <a:lstStyle/>
-          <a:p>
-            <a:pPr marL="0" indent="0">
-              <a:spcBef>
-                <a:spcPts val="1000"/>
-              </a:spcBef>
+          <a:lstStyle>
+            <a:lvl1pPr marL="0" indent="0">
               <a:buSzTx/>
               <a:buNone/>
-              <a:defRPr sz="2700"/>
-            </a:pPr>
-            <a:r>
-              <a:t>commit: </a:t>
-            </a:r>
-            <a:r>
-              <a:rPr>
-                <a:solidFill>
-                  <a:schemeClr val="accent5">
-                    <a:lumOff val="-29866"/>
-                  </a:schemeClr>
-                </a:solidFill>
-              </a:rPr>
-              <a:t>abbr commit hash</a:t>
-            </a:r>
-            <a:r>
-              <a:t> </a:t>
-            </a:r>
-            <a:r>
-              <a:rPr>
-                <a:solidFill>
-                  <a:schemeClr val="accent5">
-                    <a:hueOff val="-82419"/>
-                    <a:satOff val="-9513"/>
-                    <a:lumOff val="-16343"/>
-                  </a:schemeClr>
-                </a:solidFill>
-              </a:rPr>
-              <a:t>&lt;commit hash&gt;</a:t>
-            </a:r>
-            <a:r>
-              <a:t> </a:t>
-            </a:r>
-            <a:r>
-              <a:rPr>
-                <a:solidFill>
-                  <a:schemeClr val="accent6">
-                    <a:hueOff val="-146070"/>
-                    <a:satOff val="-10048"/>
-                    <a:lumOff val="-30626"/>
-                  </a:schemeClr>
-                </a:solidFill>
-              </a:rPr>
-              <a:t>(ref names)</a:t>
-            </a:r>
-          </a:p>
-          <a:p>
-            <a:pPr marL="0" indent="0">
-              <a:spcBef>
-                <a:spcPts val="1000"/>
-              </a:spcBef>
-              <a:buSzTx/>
-              <a:buNone/>
-              <a:defRPr sz="2700"/>
-            </a:pPr>
-            <a:r>
-              <a:t>date: </a:t>
-            </a:r>
-            <a:r>
-              <a:rPr>
-                <a:solidFill>
-                  <a:schemeClr val="accent4">
-                    <a:hueOff val="-1081314"/>
-                    <a:satOff val="4338"/>
-                    <a:lumOff val="-8931"/>
-                  </a:schemeClr>
-                </a:solidFill>
-              </a:rPr>
-              <a:t>Commit Date </a:t>
-            </a:r>
-            <a:r>
-              <a:rPr>
-                <a:solidFill>
-                  <a:schemeClr val="accent4"/>
-                </a:solidFill>
-              </a:rPr>
-              <a:t>Commit Date relative</a:t>
-            </a:r>
-          </a:p>
-          <a:p>
-            <a:pPr marL="0" indent="0">
-              <a:spcBef>
-                <a:spcPts val="1000"/>
-              </a:spcBef>
-              <a:buSzTx/>
-              <a:buNone/>
-              <a:defRPr sz="2700"/>
-            </a:pPr>
-            <a:r>
-              <a:t>author: </a:t>
-            </a:r>
-            <a:r>
-              <a:rPr>
-                <a:solidFill>
-                  <a:schemeClr val="accent1">
-                    <a:hueOff val="114395"/>
-                    <a:lumOff val="-24975"/>
-                  </a:schemeClr>
-                </a:solidFill>
-              </a:rPr>
-              <a:t>Author name &lt;</a:t>
-            </a:r>
-            <a:r>
-              <a:rPr>
-                <a:solidFill>
-                  <a:schemeClr val="accent1">
-                    <a:lumOff val="-13575"/>
-                  </a:schemeClr>
-                </a:solidFill>
-              </a:rPr>
-              <a:t>Author email&gt;</a:t>
-            </a:r>
-            <a:endParaRPr>
-              <a:solidFill>
-                <a:schemeClr val="accent1">
-                  <a:lumOff val="-13575"/>
-                </a:schemeClr>
-              </a:solidFill>
-            </a:endParaRPr>
-          </a:p>
-          <a:p>
-            <a:pPr marL="0" indent="0">
-              <a:spcBef>
-                <a:spcPts val="1000"/>
-              </a:spcBef>
-              <a:buSzTx/>
-              <a:buNone/>
-              <a:defRPr sz="2700">
-                <a:solidFill>
-                  <a:schemeClr val="accent1">
-                    <a:lumOff val="16847"/>
-                  </a:schemeClr>
-                </a:solidFill>
-              </a:defRPr>
-            </a:pPr>
-            <a:r>
-              <a:t>Subject</a:t>
+            </a:lvl1pPr>
+          </a:lstStyle>
+          <a:p>
+            <a:pPr/>
+            <a:r>
+              <a:t>git log --graph --pretty=format:'commit: %C(bold red)%h%Creset %C(red)&lt;%H&gt;%Creset %C(bold magenta)%d %Creset%ndate: %C(bold yellow)%cd %Creset%C(yellow)%cr%Creset%nauthor: %C(bold blue)%an%Creset %C(blue)&lt;%ae&gt;%Creset%n%C(cyan)%s%n%Creset'</a:t>
             </a:r>
           </a:p>
         </p:txBody>
@@ -6427,10 +6268,10 @@
       </p:grpSpPr>
       <p:sp>
         <p:nvSpPr>
-          <p:cNvPr id="229" name="commit: %h &lt;%H&gt; %d…"/>
+          <p:cNvPr id="228" name="--pretty=format"/>
           <p:cNvSpPr txBox="1"/>
           <p:nvPr>
-            <p:ph type="body" idx="1"/>
+            <p:ph type="title"/>
           </p:nvPr>
         </p:nvSpPr>
         <p:spPr>
@@ -6442,9 +6283,37 @@
           <a:bodyPr/>
           <a:lstStyle/>
           <a:p>
+            <a:pPr/>
+            <a:r>
+              <a:t>--pretty=format</a:t>
+            </a:r>
+          </a:p>
+        </p:txBody>
+      </p:sp>
+      <p:sp>
+        <p:nvSpPr>
+          <p:cNvPr id="229" name="commit: abbr commit hash &lt;commit hash&gt; (ref names)…"/>
+          <p:cNvSpPr txBox="1"/>
+          <p:nvPr>
+            <p:ph type="body" idx="1"/>
+          </p:nvPr>
+        </p:nvSpPr>
+        <p:spPr>
+          <a:prstGeom prst="rect">
+            <a:avLst/>
+          </a:prstGeom>
+        </p:spPr>
+        <p:txBody>
+          <a:bodyPr/>
+          <a:lstStyle/>
+          <a:p>
             <a:pPr marL="0" indent="0">
+              <a:spcBef>
+                <a:spcPts val="1000"/>
+              </a:spcBef>
               <a:buSzTx/>
               <a:buNone/>
+              <a:defRPr sz="2700"/>
             </a:pPr>
             <a:r>
               <a:t>commit: </a:t>
@@ -6457,7 +6326,7 @@
                   </a:schemeClr>
                 </a:solidFill>
               </a:rPr>
-              <a:t>%h</a:t>
+              <a:t>abbr commit hash</a:t>
             </a:r>
             <a:r>
               <a:t> </a:t>
@@ -6472,7 +6341,7 @@
                   </a:schemeClr>
                 </a:solidFill>
               </a:rPr>
-              <a:t>&lt;%H&gt;</a:t>
+              <a:t>&lt;commit hash&gt;</a:t>
             </a:r>
             <a:r>
               <a:t> </a:t>
@@ -6487,13 +6356,17 @@
                   </a:schemeClr>
                 </a:solidFill>
               </a:rPr>
-              <a:t>%d</a:t>
+              <a:t>(ref names)</a:t>
             </a:r>
           </a:p>
           <a:p>
             <a:pPr marL="0" indent="0">
+              <a:spcBef>
+                <a:spcPts val="1000"/>
+              </a:spcBef>
               <a:buSzTx/>
               <a:buNone/>
+              <a:defRPr sz="2700"/>
             </a:pPr>
             <a:r>
               <a:t>date: </a:t>
@@ -6508,10 +6381,7 @@
                   </a:schemeClr>
                 </a:solidFill>
               </a:rPr>
-              <a:t>%cd</a:t>
-            </a:r>
-            <a:r>
-              <a:t> </a:t>
+              <a:t>Commit Date </a:t>
             </a:r>
             <a:r>
               <a:rPr>
@@ -6519,13 +6389,17 @@
                   <a:schemeClr val="accent4"/>
                 </a:solidFill>
               </a:rPr>
-              <a:t>%cr</a:t>
+              <a:t>Commit Date relative</a:t>
             </a:r>
           </a:p>
           <a:p>
             <a:pPr marL="0" indent="0">
+              <a:spcBef>
+                <a:spcPts val="1000"/>
+              </a:spcBef>
               <a:buSzTx/>
               <a:buNone/>
+              <a:defRPr sz="2700"/>
             </a:pPr>
             <a:r>
               <a:t>author: </a:t>
@@ -6539,10 +6413,7 @@
                   </a:schemeClr>
                 </a:solidFill>
               </a:rPr>
-              <a:t>%an</a:t>
-            </a:r>
-            <a:r>
-              <a:t> </a:t>
+              <a:t>Author name &lt;</a:t>
             </a:r>
             <a:r>
               <a:rPr>
@@ -6552,14 +6423,24 @@
                   </a:schemeClr>
                 </a:solidFill>
               </a:rPr>
-              <a:t>&lt;%ae&gt;</a:t>
-            </a:r>
+              <a:t>Author email&gt;</a:t>
+            </a:r>
+            <a:endParaRPr>
+              <a:solidFill>
+                <a:schemeClr val="accent1">
+                  <a:lumOff val="-13575"/>
+                </a:schemeClr>
+              </a:solidFill>
+            </a:endParaRPr>
           </a:p>
           <a:p>
             <a:pPr marL="0" indent="0">
+              <a:spcBef>
+                <a:spcPts val="1000"/>
+              </a:spcBef>
               <a:buSzTx/>
               <a:buNone/>
-              <a:defRPr>
+              <a:defRPr sz="2700">
                 <a:solidFill>
                   <a:schemeClr val="accent1">
                     <a:lumOff val="16847"/>
@@ -6568,7 +6449,7 @@
               </a:defRPr>
             </a:pPr>
             <a:r>
-              <a:t>%s</a:t>
+              <a:t>Subject</a:t>
             </a:r>
           </a:p>
         </p:txBody>
@@ -6601,10 +6482,10 @@
       </p:grpSpPr>
       <p:sp>
         <p:nvSpPr>
-          <p:cNvPr id="231" name="Bonus #2: Alias"/>
+          <p:cNvPr id="231" name="commit: %h &lt;%H&gt; %d…"/>
           <p:cNvSpPr txBox="1"/>
           <p:nvPr>
-            <p:ph type="title"/>
+            <p:ph type="body" idx="1"/>
           </p:nvPr>
         </p:nvSpPr>
         <p:spPr>
@@ -6616,38 +6497,133 @@
           <a:bodyPr/>
           <a:lstStyle/>
           <a:p>
-            <a:pPr/>
-            <a:r>
-              <a:t>Bonus #2: Alias</a:t>
-            </a:r>
-          </a:p>
-        </p:txBody>
-      </p:sp>
-      <p:sp>
-        <p:nvSpPr>
-          <p:cNvPr id="232" name="git config --global alias.smartlog &quot;log --graph --pretty=format:'commit: %C(bold red)%h%Creset %C(red)&lt;%H&gt;%Creset %C(bold magenta)%d %Creset%ndate: %C(bold yellow)%cd %Creset%C(yellow)%cr%Creset%nauthor: %C(bold blue)%an%Creset %C(blue)&lt;%ae&gt;%Creset%n%C(cyan)%s%n%Creset'&quot;"/>
-          <p:cNvSpPr txBox="1"/>
-          <p:nvPr>
-            <p:ph type="body" idx="1"/>
-          </p:nvPr>
-        </p:nvSpPr>
-        <p:spPr>
-          <a:prstGeom prst="rect">
-            <a:avLst/>
-          </a:prstGeom>
-        </p:spPr>
-        <p:txBody>
-          <a:bodyPr/>
-          <a:lstStyle>
-            <a:lvl1pPr marL="0" indent="0">
+            <a:pPr marL="0" indent="0">
               <a:buSzTx/>
               <a:buNone/>
-            </a:lvl1pPr>
-          </a:lstStyle>
-          <a:p>
-            <a:pPr/>
-            <a:r>
-              <a:t>git config --global alias.smartlog "log --graph --pretty=format:'commit: %C(bold red)%h%Creset %C(red)&lt;%H&gt;%Creset %C(bold magenta)%d %Creset%ndate: %C(bold yellow)%cd %Creset%C(yellow)%cr%Creset%nauthor: %C(bold blue)%an%Creset %C(blue)&lt;%ae&gt;%Creset%n%C(cyan)%s%n%Creset'"</a:t>
+            </a:pPr>
+            <a:r>
+              <a:t>commit: </a:t>
+            </a:r>
+            <a:r>
+              <a:rPr>
+                <a:solidFill>
+                  <a:schemeClr val="accent5">
+                    <a:lumOff val="-29866"/>
+                  </a:schemeClr>
+                </a:solidFill>
+              </a:rPr>
+              <a:t>%h</a:t>
+            </a:r>
+            <a:r>
+              <a:t> </a:t>
+            </a:r>
+            <a:r>
+              <a:rPr>
+                <a:solidFill>
+                  <a:schemeClr val="accent5">
+                    <a:hueOff val="-82419"/>
+                    <a:satOff val="-9513"/>
+                    <a:lumOff val="-16343"/>
+                  </a:schemeClr>
+                </a:solidFill>
+              </a:rPr>
+              <a:t>&lt;%H&gt;</a:t>
+            </a:r>
+            <a:r>
+              <a:t> </a:t>
+            </a:r>
+            <a:r>
+              <a:rPr>
+                <a:solidFill>
+                  <a:schemeClr val="accent6">
+                    <a:hueOff val="-146070"/>
+                    <a:satOff val="-10048"/>
+                    <a:lumOff val="-30626"/>
+                  </a:schemeClr>
+                </a:solidFill>
+              </a:rPr>
+              <a:t>%d</a:t>
+            </a:r>
+          </a:p>
+          <a:p>
+            <a:pPr marL="0" indent="0">
+              <a:buSzTx/>
+              <a:buNone/>
+            </a:pPr>
+            <a:r>
+              <a:t>date: </a:t>
+            </a:r>
+            <a:r>
+              <a:rPr>
+                <a:solidFill>
+                  <a:schemeClr val="accent4">
+                    <a:hueOff val="-1081314"/>
+                    <a:satOff val="4338"/>
+                    <a:lumOff val="-8931"/>
+                  </a:schemeClr>
+                </a:solidFill>
+              </a:rPr>
+              <a:t>%cd</a:t>
+            </a:r>
+            <a:r>
+              <a:t> </a:t>
+            </a:r>
+            <a:r>
+              <a:rPr>
+                <a:solidFill>
+                  <a:schemeClr val="accent4"/>
+                </a:solidFill>
+              </a:rPr>
+              <a:t>%cr</a:t>
+            </a:r>
+          </a:p>
+          <a:p>
+            <a:pPr marL="0" indent="0">
+              <a:buSzTx/>
+              <a:buNone/>
+            </a:pPr>
+            <a:r>
+              <a:t>author: </a:t>
+            </a:r>
+            <a:r>
+              <a:rPr>
+                <a:solidFill>
+                  <a:schemeClr val="accent1">
+                    <a:hueOff val="114395"/>
+                    <a:lumOff val="-24975"/>
+                  </a:schemeClr>
+                </a:solidFill>
+              </a:rPr>
+              <a:t>%an</a:t>
+            </a:r>
+            <a:r>
+              <a:t> </a:t>
+            </a:r>
+            <a:r>
+              <a:rPr>
+                <a:solidFill>
+                  <a:schemeClr val="accent1">
+                    <a:lumOff val="-13575"/>
+                  </a:schemeClr>
+                </a:solidFill>
+              </a:rPr>
+              <a:t>&lt;%ae&gt;</a:t>
+            </a:r>
+          </a:p>
+          <a:p>
+            <a:pPr marL="0" indent="0">
+              <a:buSzTx/>
+              <a:buNone/>
+              <a:defRPr>
+                <a:solidFill>
+                  <a:schemeClr val="accent1">
+                    <a:lumOff val="16847"/>
+                  </a:schemeClr>
+                </a:solidFill>
+              </a:defRPr>
+            </a:pPr>
+            <a:r>
+              <a:t>%s</a:t>
             </a:r>
           </a:p>
         </p:txBody>
@@ -6680,7 +6656,7 @@
       </p:grpSpPr>
       <p:sp>
         <p:nvSpPr>
-          <p:cNvPr id="234" name="Git Alias"/>
+          <p:cNvPr id="233" name="Bonus #2: Alias"/>
           <p:cNvSpPr txBox="1"/>
           <p:nvPr>
             <p:ph type="title"/>
@@ -6697,6 +6673,85 @@
           <a:p>
             <a:pPr/>
             <a:r>
+              <a:t>Bonus #2: Alias</a:t>
+            </a:r>
+          </a:p>
+        </p:txBody>
+      </p:sp>
+      <p:sp>
+        <p:nvSpPr>
+          <p:cNvPr id="234" name="git config --global alias.smartlog &quot;log --graph --pretty=format:'commit: %C(bold red)%h%Creset %C(red)&lt;%H&gt;%Creset %C(bold magenta)%d %Creset%ndate: %C(bold yellow)%cd %Creset%C(yellow)%cr%Creset%nauthor: %C(bold blue)%an%Creset %C(blue)&lt;%ae&gt;%Creset%n%C(cyan)%s%n%Creset'&quot;"/>
+          <p:cNvSpPr txBox="1"/>
+          <p:nvPr>
+            <p:ph type="body" idx="1"/>
+          </p:nvPr>
+        </p:nvSpPr>
+        <p:spPr>
+          <a:prstGeom prst="rect">
+            <a:avLst/>
+          </a:prstGeom>
+        </p:spPr>
+        <p:txBody>
+          <a:bodyPr/>
+          <a:lstStyle>
+            <a:lvl1pPr marL="0" indent="0">
+              <a:buSzTx/>
+              <a:buNone/>
+            </a:lvl1pPr>
+          </a:lstStyle>
+          <a:p>
+            <a:pPr/>
+            <a:r>
+              <a:t>git config --global alias.smartlog "log --graph --pretty=format:'commit: %C(bold red)%h%Creset %C(red)&lt;%H&gt;%Creset %C(bold magenta)%d %Creset%ndate: %C(bold yellow)%cd %Creset%C(yellow)%cr%Creset%nauthor: %C(bold blue)%an%Creset %C(blue)&lt;%ae&gt;%Creset%n%C(cyan)%s%n%Creset'"</a:t>
+            </a:r>
+          </a:p>
+        </p:txBody>
+      </p:sp>
+    </p:spTree>
+  </p:cSld>
+  <p:clrMapOvr>
+    <a:masterClrMapping/>
+  </p:clrMapOvr>
+  <p:transition xmlns:p14="http://schemas.microsoft.com/office/powerpoint/2010/main" spd="med" advClick="1"/>
+</p:sld>
+</file>
+
+<file path=ppt/slides/slide36.xml><?xml version="1.0" encoding="utf-8"?>
+<p:sld xmlns:a="http://schemas.openxmlformats.org/drawingml/2006/main" xmlns:r="http://schemas.openxmlformats.org/officeDocument/2006/relationships" xmlns:p="http://schemas.openxmlformats.org/presentationml/2006/main" xmlns:m="http://schemas.openxmlformats.org/officeDocument/2006/math" xmlns:a14="http://schemas.microsoft.com/office/drawing/2010/main" showMasterSp="1" showMasterPhAnim="1">
+  <p:cSld>
+    <p:spTree>
+      <p:nvGrpSpPr>
+        <p:cNvPr id="1" name=""/>
+        <p:cNvGrpSpPr/>
+        <p:nvPr/>
+      </p:nvGrpSpPr>
+      <p:grpSpPr>
+        <a:xfrm>
+          <a:off x="0" y="0"/>
+          <a:ext cx="0" cy="0"/>
+          <a:chOff x="0" y="0"/>
+          <a:chExt cx="0" cy="0"/>
+        </a:xfrm>
+      </p:grpSpPr>
+      <p:sp>
+        <p:nvSpPr>
+          <p:cNvPr id="236" name="Git Alias"/>
+          <p:cNvSpPr txBox="1"/>
+          <p:nvPr>
+            <p:ph type="title"/>
+          </p:nvPr>
+        </p:nvSpPr>
+        <p:spPr>
+          <a:prstGeom prst="rect">
+            <a:avLst/>
+          </a:prstGeom>
+        </p:spPr>
+        <p:txBody>
+          <a:bodyPr/>
+          <a:lstStyle/>
+          <a:p>
+            <a:pPr/>
+            <a:r>
               <a:t>Git Alias</a:t>
             </a:r>
           </a:p>
@@ -6704,7 +6759,7 @@
       </p:sp>
       <p:sp>
         <p:nvSpPr>
-          <p:cNvPr id="235" name="git config --global alias.smartlog “…”…"/>
+          <p:cNvPr id="237" name="git config --global alias.smartlog “…”…"/>
           <p:cNvSpPr txBox="1"/>
           <p:nvPr>
             <p:ph type="body" idx="1"/>

</xml_diff>